<commit_message>
add somework and lecture
</commit_message>
<xml_diff>
--- a/Work/present v1.pptx
+++ b/Work/present v1.pptx
@@ -8,9 +8,12 @@
     <p:sldId id="256" r:id="rId2"/>
     <p:sldId id="257" r:id="rId3"/>
     <p:sldId id="258" r:id="rId4"/>
-    <p:sldId id="259" r:id="rId5"/>
-    <p:sldId id="260" r:id="rId6"/>
-    <p:sldId id="261" r:id="rId7"/>
+    <p:sldId id="263" r:id="rId5"/>
+    <p:sldId id="264" r:id="rId6"/>
+    <p:sldId id="259" r:id="rId7"/>
+    <p:sldId id="262" r:id="rId8"/>
+    <p:sldId id="260" r:id="rId9"/>
+    <p:sldId id="261" r:id="rId10"/>
   </p:sldIdLst>
   <p:sldSz cx="12192000" cy="6858000"/>
   <p:notesSz cx="6858000" cy="9144000"/>
@@ -109,7 +112,16 @@
       </a:defRPr>
     </a:lvl9pPr>
   </p:defaultTextStyle>
+  <p:extLst>
+    <p:ext uri="{EFAFB233-063F-42B5-8137-9DF3F51BA10A}">
+      <p15:sldGuideLst xmlns:p15="http://schemas.microsoft.com/office/powerpoint/2012/main"/>
+    </p:ext>
+  </p:extLst>
 </p:presentation>
+</file>
+
+<file path=ppt/revisionInfo.xml><?xml version="1.0" encoding="utf-8"?>
+<p1510:revInfo xmlns:a="http://schemas.openxmlformats.org/drawingml/2006/main" xmlns:r="http://schemas.openxmlformats.org/officeDocument/2006/relationships" xmlns:p1510="http://schemas.microsoft.com/office/powerpoint/2015/10/main"/>
 </file>
 
 <file path=ppt/slideLayouts/slideLayout1.xml><?xml version="1.0" encoding="utf-8"?>
@@ -834,7 +846,7 @@
           <a:p>
             <a:fld id="{F32F5DCA-6F41-44EC-B59D-76BC493C00FA}" type="datetimeFigureOut">
               <a:rPr lang="en-US" smtClean="0"/>
-              <a:t>8/28/2017</a:t>
+              <a:t>8/30/2017</a:t>
             </a:fld>
             <a:endParaRPr lang="en-US"/>
           </a:p>
@@ -1085,7 +1097,7 @@
           <a:p>
             <a:fld id="{F32F5DCA-6F41-44EC-B59D-76BC493C00FA}" type="datetimeFigureOut">
               <a:rPr lang="en-US" smtClean="0"/>
-              <a:t>8/28/2017</a:t>
+              <a:t>8/30/2017</a:t>
             </a:fld>
             <a:endParaRPr lang="en-US"/>
           </a:p>
@@ -1399,7 +1411,7 @@
           <a:p>
             <a:fld id="{F32F5DCA-6F41-44EC-B59D-76BC493C00FA}" type="datetimeFigureOut">
               <a:rPr lang="en-US" smtClean="0"/>
-              <a:t>8/28/2017</a:t>
+              <a:t>8/30/2017</a:t>
             </a:fld>
             <a:endParaRPr lang="en-US"/>
           </a:p>
@@ -1740,7 +1752,7 @@
           <a:p>
             <a:fld id="{F32F5DCA-6F41-44EC-B59D-76BC493C00FA}" type="datetimeFigureOut">
               <a:rPr lang="en-US" smtClean="0"/>
-              <a:t>8/28/2017</a:t>
+              <a:t>8/30/2017</a:t>
             </a:fld>
             <a:endParaRPr lang="en-US"/>
           </a:p>
@@ -2054,7 +2066,7 @@
           <a:p>
             <a:fld id="{F32F5DCA-6F41-44EC-B59D-76BC493C00FA}" type="datetimeFigureOut">
               <a:rPr lang="en-US" smtClean="0"/>
-              <a:t>8/28/2017</a:t>
+              <a:t>8/30/2017</a:t>
             </a:fld>
             <a:endParaRPr lang="en-US"/>
           </a:p>
@@ -2447,7 +2459,7 @@
           <a:p>
             <a:fld id="{F32F5DCA-6F41-44EC-B59D-76BC493C00FA}" type="datetimeFigureOut">
               <a:rPr lang="en-US" smtClean="0"/>
-              <a:t>8/28/2017</a:t>
+              <a:t>8/30/2017</a:t>
             </a:fld>
             <a:endParaRPr lang="en-US"/>
           </a:p>
@@ -2617,7 +2629,7 @@
           <a:p>
             <a:fld id="{F32F5DCA-6F41-44EC-B59D-76BC493C00FA}" type="datetimeFigureOut">
               <a:rPr lang="en-US" smtClean="0"/>
-              <a:t>8/28/2017</a:t>
+              <a:t>8/30/2017</a:t>
             </a:fld>
             <a:endParaRPr lang="en-US"/>
           </a:p>
@@ -2797,7 +2809,7 @@
           <a:p>
             <a:fld id="{F32F5DCA-6F41-44EC-B59D-76BC493C00FA}" type="datetimeFigureOut">
               <a:rPr lang="en-US" smtClean="0"/>
-              <a:t>8/28/2017</a:t>
+              <a:t>8/30/2017</a:t>
             </a:fld>
             <a:endParaRPr lang="en-US"/>
           </a:p>
@@ -2973,7 +2985,7 @@
           <a:p>
             <a:fld id="{F32F5DCA-6F41-44EC-B59D-76BC493C00FA}" type="datetimeFigureOut">
               <a:rPr lang="en-US" smtClean="0"/>
-              <a:t>8/28/2017</a:t>
+              <a:t>8/30/2017</a:t>
             </a:fld>
             <a:endParaRPr lang="en-US"/>
           </a:p>
@@ -3220,7 +3232,7 @@
           <a:p>
             <a:fld id="{F32F5DCA-6F41-44EC-B59D-76BC493C00FA}" type="datetimeFigureOut">
               <a:rPr lang="en-US" smtClean="0"/>
-              <a:t>8/28/2017</a:t>
+              <a:t>8/30/2017</a:t>
             </a:fld>
             <a:endParaRPr lang="en-US"/>
           </a:p>
@@ -3452,7 +3464,7 @@
           <a:p>
             <a:fld id="{F32F5DCA-6F41-44EC-B59D-76BC493C00FA}" type="datetimeFigureOut">
               <a:rPr lang="en-US" smtClean="0"/>
-              <a:t>8/28/2017</a:t>
+              <a:t>8/30/2017</a:t>
             </a:fld>
             <a:endParaRPr lang="en-US"/>
           </a:p>
@@ -3826,7 +3838,7 @@
           <a:p>
             <a:fld id="{F32F5DCA-6F41-44EC-B59D-76BC493C00FA}" type="datetimeFigureOut">
               <a:rPr lang="en-US" smtClean="0"/>
-              <a:t>8/28/2017</a:t>
+              <a:t>8/30/2017</a:t>
             </a:fld>
             <a:endParaRPr lang="en-US"/>
           </a:p>
@@ -3949,7 +3961,7 @@
           <a:p>
             <a:fld id="{F32F5DCA-6F41-44EC-B59D-76BC493C00FA}" type="datetimeFigureOut">
               <a:rPr lang="en-US" smtClean="0"/>
-              <a:t>8/28/2017</a:t>
+              <a:t>8/30/2017</a:t>
             </a:fld>
             <a:endParaRPr lang="en-US"/>
           </a:p>
@@ -4044,7 +4056,7 @@
           <a:p>
             <a:fld id="{F32F5DCA-6F41-44EC-B59D-76BC493C00FA}" type="datetimeFigureOut">
               <a:rPr lang="en-US" smtClean="0"/>
-              <a:t>8/28/2017</a:t>
+              <a:t>8/30/2017</a:t>
             </a:fld>
             <a:endParaRPr lang="en-US"/>
           </a:p>
@@ -4299,7 +4311,7 @@
           <a:p>
             <a:fld id="{F32F5DCA-6F41-44EC-B59D-76BC493C00FA}" type="datetimeFigureOut">
               <a:rPr lang="en-US" smtClean="0"/>
-              <a:t>8/28/2017</a:t>
+              <a:t>8/30/2017</a:t>
             </a:fld>
             <a:endParaRPr lang="en-US"/>
           </a:p>
@@ -4562,7 +4574,7 @@
           <a:p>
             <a:fld id="{F32F5DCA-6F41-44EC-B59D-76BC493C00FA}" type="datetimeFigureOut">
               <a:rPr lang="en-US" smtClean="0"/>
-              <a:t>8/28/2017</a:t>
+              <a:t>8/30/2017</a:t>
             </a:fld>
             <a:endParaRPr lang="en-US"/>
           </a:p>
@@ -5305,7 +5317,7 @@
           <a:p>
             <a:fld id="{F32F5DCA-6F41-44EC-B59D-76BC493C00FA}" type="datetimeFigureOut">
               <a:rPr lang="en-US" smtClean="0"/>
-              <a:t>8/28/2017</a:t>
+              <a:t>8/30/2017</a:t>
             </a:fld>
             <a:endParaRPr lang="en-US"/>
           </a:p>
@@ -5997,9 +6009,12 @@
             </a:r>
             <a:r>
               <a:rPr lang="th-TH" dirty="0"/>
-              <a:t>ตาราง 9 ช่อง’ จึงถูกพัฒนาขึ้นมาเพื่อตอบโจทย์ในการฝึกร่างกายให้เคยชินกับการเคลื่อนไหวในมิติต่างๆ รวมไปถึงต่อยอดสู่การพัฒนาสมอง โดย ‘รศ.เจริญ กระบวนรัตน์’ อาจารย์ประจำคณะวิทยาศาสตร์การกีฬา มหาวิทยาลัยเกษตรศาสตร์ อธิบายถึงหลักการทำงานของตาราง 9 ช่องไว้ว่า “เราสร้างตาราง 9 ช่องขึ้นมาโดยอาศัยหลักการเคลื่อนไหวของมนุษย์ ซึ่งการใช้งานขึ้นอยู่กับว่า "เราจะวางเงื่อนไขให้กับสมองยังไง" โดยกำหนดการเคลื่อนที่ในแบบต่างๆ ที่ไม่มีหลักตายตัว ทุกคนสามารถใช้ได้ตั้งแต่เด็กจนถึงผู้สูงอายุ เพราะถือเป็นการออกกำลังกายที่ใช้พื้นที่น้อยมาก ทั้งยังมีประโยชน์ในด้านกระตุ้นการทำงานของสมองเพื่อพัฒนาความสามารถในการคิด การตัดสินใจ และการแก้ปัญหาไปพร้อมๆ กันด้วย”</a:t>
-            </a:r>
-            <a:endParaRPr lang="en-US" dirty="0"/>
+              <a:t>ตาราง 9 ช่อง’ จึงถูกพัฒนาขึ้นมาเพื่อตอบโจทย์ในการฝึกร่างกายให้เคยชินกับการเคลื่อนไหวในมิติต่างๆ รวมไปถึงต่อยอดสู่การพัฒนาสมอง โดย ‘รศ.เจริญ กระบวนรัตน์’ อาจารย์ประจำคณะวิทยาศาสตร์การกีฬา มหาวิทยาลัยเกษตรศาสตร์ อธิบายถึงหลักการทำงานของตาราง 9 ช่องไว้ว่า “เราสร้างตาราง 9 ช่องขึ้นมาโดยอาศัยหลักการเคลื่อนไหวของมนุษย์ ซึ่งการใช้งานขึ้นอยู่กับว่า "เราจะวางเงื่อนไขให้กับสมองยังไง" โดยกำหนดการเคลื่อนที่ในแบบต่างๆ ที่ไม่มีหลักตายตัว ทุกคนสามารถใช้ได้ตั้งแต่เด็กจนถึงผู้สูงอายุ เพราะถือเป็นการออกกำลังกายที่ใช้พื้นที่น้อยมาก ทั้งยังมีประโยชน์ในด้านกระตุ้นการทำงานของสมองเพื่อพัฒนาความสามารถในการคิด การตัดสินใจ และการแก้ปัญหาไปพร้อมๆ กันด้วย</a:t>
+            </a:r>
+            <a:r>
+              <a:rPr lang="en-US" dirty="0"/>
+              <a:t>’</a:t>
+            </a:r>
           </a:p>
         </p:txBody>
       </p:sp>
@@ -6381,6 +6396,214 @@
           <p:cNvPr id="2" name="Title 1">
             <a:extLst>
               <a:ext uri="{FF2B5EF4-FFF2-40B4-BE49-F238E27FC236}">
+                <a16:creationId xmlns:a16="http://schemas.microsoft.com/office/drawing/2014/main" id="{C040B21C-03A3-434F-88D6-03936EDEF0ED}"/>
+              </a:ext>
+            </a:extLst>
+          </p:cNvPr>
+          <p:cNvSpPr>
+            <a:spLocks noGrp="1"/>
+          </p:cNvSpPr>
+          <p:nvPr>
+            <p:ph type="title"/>
+          </p:nvPr>
+        </p:nvSpPr>
+        <p:spPr>
+          <a:xfrm>
+            <a:off x="488798" y="416249"/>
+            <a:ext cx="8596668" cy="1320800"/>
+          </a:xfrm>
+        </p:spPr>
+        <p:txBody>
+          <a:bodyPr/>
+          <a:lstStyle/>
+          <a:p>
+            <a:r>
+              <a:rPr lang="th-TH" dirty="0"/>
+              <a:t>โครงสร้างอุปกรณ์และการทำงานเบื้องต้น</a:t>
+            </a:r>
+            <a:endParaRPr lang="en-US" dirty="0"/>
+          </a:p>
+        </p:txBody>
+      </p:sp>
+      <p:sp>
+        <p:nvSpPr>
+          <p:cNvPr id="3" name="Content Placeholder 2">
+            <a:extLst>
+              <a:ext uri="{FF2B5EF4-FFF2-40B4-BE49-F238E27FC236}">
+                <a16:creationId xmlns:a16="http://schemas.microsoft.com/office/drawing/2014/main" id="{BE02CCDC-D942-4031-B687-DE7EC71FDCF7}"/>
+              </a:ext>
+            </a:extLst>
+          </p:cNvPr>
+          <p:cNvSpPr>
+            <a:spLocks noGrp="1"/>
+          </p:cNvSpPr>
+          <p:nvPr>
+            <p:ph idx="1"/>
+          </p:nvPr>
+        </p:nvSpPr>
+        <p:spPr/>
+        <p:txBody>
+          <a:bodyPr/>
+          <a:lstStyle/>
+          <a:p>
+            <a:endParaRPr lang="en-US"/>
+          </a:p>
+        </p:txBody>
+      </p:sp>
+      <p:pic>
+        <p:nvPicPr>
+          <p:cNvPr id="5" name="Picture 4">
+            <a:extLst>
+              <a:ext uri="{FF2B5EF4-FFF2-40B4-BE49-F238E27FC236}">
+                <a16:creationId xmlns:a16="http://schemas.microsoft.com/office/drawing/2014/main" id="{E78F462D-7D95-4600-9D97-C112B1715E46}"/>
+              </a:ext>
+            </a:extLst>
+          </p:cNvPr>
+          <p:cNvPicPr>
+            <a:picLocks noChangeAspect="1"/>
+          </p:cNvPicPr>
+          <p:nvPr/>
+        </p:nvPicPr>
+        <p:blipFill>
+          <a:blip r:embed="rId2"/>
+          <a:stretch>
+            <a:fillRect/>
+          </a:stretch>
+        </p:blipFill>
+        <p:spPr>
+          <a:xfrm>
+            <a:off x="213360" y="995680"/>
+            <a:ext cx="10678160" cy="5339080"/>
+          </a:xfrm>
+          <a:prstGeom prst="rect">
+            <a:avLst/>
+          </a:prstGeom>
+        </p:spPr>
+      </p:pic>
+    </p:spTree>
+    <p:extLst>
+      <p:ext uri="{BB962C8B-B14F-4D97-AF65-F5344CB8AC3E}">
+        <p14:creationId xmlns:p14="http://schemas.microsoft.com/office/powerpoint/2010/main" val="1592077870"/>
+      </p:ext>
+    </p:extLst>
+  </p:cSld>
+  <p:clrMapOvr>
+    <a:masterClrMapping/>
+  </p:clrMapOvr>
+</p:sld>
+</file>
+
+<file path=ppt/slides/slide5.xml><?xml version="1.0" encoding="utf-8"?>
+<p:sld xmlns:a="http://schemas.openxmlformats.org/drawingml/2006/main" xmlns:r="http://schemas.openxmlformats.org/officeDocument/2006/relationships" xmlns:p="http://schemas.openxmlformats.org/presentationml/2006/main">
+  <p:cSld>
+    <p:spTree>
+      <p:nvGrpSpPr>
+        <p:cNvPr id="1" name=""/>
+        <p:cNvGrpSpPr/>
+        <p:nvPr/>
+      </p:nvGrpSpPr>
+      <p:grpSpPr>
+        <a:xfrm>
+          <a:off x="0" y="0"/>
+          <a:ext cx="0" cy="0"/>
+          <a:chOff x="0" y="0"/>
+          <a:chExt cx="0" cy="0"/>
+        </a:xfrm>
+      </p:grpSpPr>
+      <p:pic>
+        <p:nvPicPr>
+          <p:cNvPr id="4" name="Picture 3">
+            <a:extLst>
+              <a:ext uri="{FF2B5EF4-FFF2-40B4-BE49-F238E27FC236}">
+                <a16:creationId xmlns:a16="http://schemas.microsoft.com/office/drawing/2014/main" id="{D572DB94-F087-4766-BE0F-172EC7F8C463}"/>
+              </a:ext>
+            </a:extLst>
+          </p:cNvPr>
+          <p:cNvPicPr>
+            <a:picLocks noChangeAspect="1"/>
+          </p:cNvPicPr>
+          <p:nvPr/>
+        </p:nvPicPr>
+        <p:blipFill>
+          <a:blip r:embed="rId2"/>
+          <a:stretch>
+            <a:fillRect/>
+          </a:stretch>
+        </p:blipFill>
+        <p:spPr>
+          <a:xfrm>
+            <a:off x="677334" y="1863788"/>
+            <a:ext cx="8733981" cy="4356100"/>
+          </a:xfrm>
+          <a:prstGeom prst="rect">
+            <a:avLst/>
+          </a:prstGeom>
+        </p:spPr>
+      </p:pic>
+      <p:sp>
+        <p:nvSpPr>
+          <p:cNvPr id="2" name="Title 1">
+            <a:extLst>
+              <a:ext uri="{FF2B5EF4-FFF2-40B4-BE49-F238E27FC236}">
+                <a16:creationId xmlns:a16="http://schemas.microsoft.com/office/drawing/2014/main" id="{506D58CB-7AD5-4552-ADEE-11DD5233E15A}"/>
+              </a:ext>
+            </a:extLst>
+          </p:cNvPr>
+          <p:cNvSpPr>
+            <a:spLocks noGrp="1"/>
+          </p:cNvSpPr>
+          <p:nvPr>
+            <p:ph type="title"/>
+          </p:nvPr>
+        </p:nvSpPr>
+        <p:spPr/>
+        <p:txBody>
+          <a:bodyPr/>
+          <a:lstStyle/>
+          <a:p>
+            <a:r>
+              <a:rPr lang="th-TH"/>
+              <a:t>โครงสร้างระบบโดยสังเขป</a:t>
+            </a:r>
+            <a:endParaRPr lang="en-US" dirty="0"/>
+          </a:p>
+        </p:txBody>
+      </p:sp>
+    </p:spTree>
+    <p:extLst>
+      <p:ext uri="{BB962C8B-B14F-4D97-AF65-F5344CB8AC3E}">
+        <p14:creationId xmlns:p14="http://schemas.microsoft.com/office/powerpoint/2010/main" val="3913236716"/>
+      </p:ext>
+    </p:extLst>
+  </p:cSld>
+  <p:clrMapOvr>
+    <a:masterClrMapping/>
+  </p:clrMapOvr>
+</p:sld>
+</file>
+
+<file path=ppt/slides/slide6.xml><?xml version="1.0" encoding="utf-8"?>
+<p:sld xmlns:a="http://schemas.openxmlformats.org/drawingml/2006/main" xmlns:r="http://schemas.openxmlformats.org/officeDocument/2006/relationships" xmlns:p="http://schemas.openxmlformats.org/presentationml/2006/main">
+  <p:cSld>
+    <p:spTree>
+      <p:nvGrpSpPr>
+        <p:cNvPr id="1" name=""/>
+        <p:cNvGrpSpPr/>
+        <p:nvPr/>
+      </p:nvGrpSpPr>
+      <p:grpSpPr>
+        <a:xfrm>
+          <a:off x="0" y="0"/>
+          <a:ext cx="0" cy="0"/>
+          <a:chOff x="0" y="0"/>
+          <a:chExt cx="0" cy="0"/>
+        </a:xfrm>
+      </p:grpSpPr>
+      <p:sp>
+        <p:nvSpPr>
+          <p:cNvPr id="2" name="Title 1">
+            <a:extLst>
+              <a:ext uri="{FF2B5EF4-FFF2-40B4-BE49-F238E27FC236}">
                 <a16:creationId xmlns:a16="http://schemas.microsoft.com/office/drawing/2014/main" id="{7C16E5F1-D8FF-4C0E-B6AF-860FD22452BA}"/>
               </a:ext>
             </a:extLst>
@@ -6628,7 +6851,230 @@
 </p:sld>
 </file>
 
-<file path=ppt/slides/slide5.xml><?xml version="1.0" encoding="utf-8"?>
+<file path=ppt/slides/slide7.xml><?xml version="1.0" encoding="utf-8"?>
+<p:sld xmlns:a="http://schemas.openxmlformats.org/drawingml/2006/main" xmlns:r="http://schemas.openxmlformats.org/officeDocument/2006/relationships" xmlns:p="http://schemas.openxmlformats.org/presentationml/2006/main">
+  <p:cSld>
+    <p:spTree>
+      <p:nvGrpSpPr>
+        <p:cNvPr id="1" name=""/>
+        <p:cNvGrpSpPr/>
+        <p:nvPr/>
+      </p:nvGrpSpPr>
+      <p:grpSpPr>
+        <a:xfrm>
+          <a:off x="0" y="0"/>
+          <a:ext cx="0" cy="0"/>
+          <a:chOff x="0" y="0"/>
+          <a:chExt cx="0" cy="0"/>
+        </a:xfrm>
+      </p:grpSpPr>
+      <p:sp>
+        <p:nvSpPr>
+          <p:cNvPr id="2" name="Title 1">
+            <a:extLst>
+              <a:ext uri="{FF2B5EF4-FFF2-40B4-BE49-F238E27FC236}">
+                <a16:creationId xmlns:a16="http://schemas.microsoft.com/office/drawing/2014/main" id="{209BC085-5EAD-4930-84BE-9DB76C51FBA6}"/>
+              </a:ext>
+            </a:extLst>
+          </p:cNvPr>
+          <p:cNvSpPr>
+            <a:spLocks noGrp="1"/>
+          </p:cNvSpPr>
+          <p:nvPr>
+            <p:ph type="title"/>
+          </p:nvPr>
+        </p:nvSpPr>
+        <p:spPr/>
+        <p:txBody>
+          <a:bodyPr/>
+          <a:lstStyle/>
+          <a:p>
+            <a:r>
+              <a:rPr lang="th-TH" dirty="0"/>
+              <a:t>อุปกรณ์ที่คาดว่าจะใช้</a:t>
+            </a:r>
+            <a:endParaRPr lang="en-US" dirty="0"/>
+          </a:p>
+        </p:txBody>
+      </p:sp>
+      <p:sp>
+        <p:nvSpPr>
+          <p:cNvPr id="4" name="TextBox 3">
+            <a:extLst>
+              <a:ext uri="{FF2B5EF4-FFF2-40B4-BE49-F238E27FC236}">
+                <a16:creationId xmlns:a16="http://schemas.microsoft.com/office/drawing/2014/main" id="{C99CC86C-F1DD-4A41-8B89-221A8D967738}"/>
+              </a:ext>
+            </a:extLst>
+          </p:cNvPr>
+          <p:cNvSpPr txBox="1"/>
+          <p:nvPr/>
+        </p:nvSpPr>
+        <p:spPr>
+          <a:xfrm>
+            <a:off x="3836710" y="1930400"/>
+            <a:ext cx="5986020" cy="369332"/>
+          </a:xfrm>
+          <a:prstGeom prst="rect">
+            <a:avLst/>
+          </a:prstGeom>
+          <a:noFill/>
+        </p:spPr>
+        <p:txBody>
+          <a:bodyPr wrap="square" rtlCol="0">
+            <a:spAutoFit/>
+          </a:bodyPr>
+          <a:lstStyle/>
+          <a:p>
+            <a:r>
+              <a:rPr lang="en-US" dirty="0"/>
+              <a:t>Distance Sensor</a:t>
+            </a:r>
+          </a:p>
+        </p:txBody>
+      </p:sp>
+      <p:pic>
+        <p:nvPicPr>
+          <p:cNvPr id="1028" name="Picture 4" descr="Ultrasonic Sensor Module (HC-SR04)">
+            <a:extLst>
+              <a:ext uri="{FF2B5EF4-FFF2-40B4-BE49-F238E27FC236}">
+                <a16:creationId xmlns:a16="http://schemas.microsoft.com/office/drawing/2014/main" id="{5DA1B41F-9ED9-4963-9B79-F80976D02904}"/>
+              </a:ext>
+            </a:extLst>
+          </p:cNvPr>
+          <p:cNvPicPr>
+            <a:picLocks noChangeAspect="1" noChangeArrowheads="1"/>
+          </p:cNvPicPr>
+          <p:nvPr/>
+        </p:nvPicPr>
+        <p:blipFill>
+          <a:blip r:embed="rId2">
+            <a:extLst>
+              <a:ext uri="{28A0092B-C50C-407E-A947-70E740481C1C}">
+                <a14:useLocalDpi xmlns:a14="http://schemas.microsoft.com/office/drawing/2010/main" val="0"/>
+              </a:ext>
+            </a:extLst>
+          </a:blip>
+          <a:srcRect/>
+          <a:stretch>
+            <a:fillRect/>
+          </a:stretch>
+        </p:blipFill>
+        <p:spPr bwMode="auto">
+          <a:xfrm>
+            <a:off x="1188720" y="1331992"/>
+            <a:ext cx="1935480" cy="1935480"/>
+          </a:xfrm>
+          <a:prstGeom prst="rect">
+            <a:avLst/>
+          </a:prstGeom>
+          <a:noFill/>
+          <a:extLst>
+            <a:ext uri="{909E8E84-426E-40DD-AFC4-6F175D3DCCD1}">
+              <a14:hiddenFill xmlns:a14="http://schemas.microsoft.com/office/drawing/2010/main">
+                <a:solidFill>
+                  <a:srgbClr val="FFFFFF"/>
+                </a:solidFill>
+              </a14:hiddenFill>
+            </a:ext>
+          </a:extLst>
+        </p:spPr>
+      </p:pic>
+      <p:pic>
+        <p:nvPicPr>
+          <p:cNvPr id="1030" name="Picture 6" descr="Raspberry Pi Zero">
+            <a:extLst>
+              <a:ext uri="{FF2B5EF4-FFF2-40B4-BE49-F238E27FC236}">
+                <a16:creationId xmlns:a16="http://schemas.microsoft.com/office/drawing/2014/main" id="{3C6C1736-AF90-44CD-9F61-EB4B3C09A383}"/>
+              </a:ext>
+            </a:extLst>
+          </p:cNvPr>
+          <p:cNvPicPr>
+            <a:picLocks noChangeAspect="1" noChangeArrowheads="1"/>
+          </p:cNvPicPr>
+          <p:nvPr/>
+        </p:nvPicPr>
+        <p:blipFill>
+          <a:blip r:embed="rId3">
+            <a:extLst>
+              <a:ext uri="{28A0092B-C50C-407E-A947-70E740481C1C}">
+                <a14:useLocalDpi xmlns:a14="http://schemas.microsoft.com/office/drawing/2010/main" val="0"/>
+              </a:ext>
+            </a:extLst>
+          </a:blip>
+          <a:srcRect/>
+          <a:stretch>
+            <a:fillRect/>
+          </a:stretch>
+        </p:blipFill>
+        <p:spPr bwMode="auto">
+          <a:xfrm>
+            <a:off x="626110" y="3093720"/>
+            <a:ext cx="3060700" cy="3060700"/>
+          </a:xfrm>
+          <a:prstGeom prst="rect">
+            <a:avLst/>
+          </a:prstGeom>
+          <a:noFill/>
+          <a:extLst>
+            <a:ext uri="{909E8E84-426E-40DD-AFC4-6F175D3DCCD1}">
+              <a14:hiddenFill xmlns:a14="http://schemas.microsoft.com/office/drawing/2010/main">
+                <a:solidFill>
+                  <a:srgbClr val="FFFFFF"/>
+                </a:solidFill>
+              </a14:hiddenFill>
+            </a:ext>
+          </a:extLst>
+        </p:spPr>
+      </p:pic>
+      <p:sp>
+        <p:nvSpPr>
+          <p:cNvPr id="9" name="TextBox 8">
+            <a:extLst>
+              <a:ext uri="{FF2B5EF4-FFF2-40B4-BE49-F238E27FC236}">
+                <a16:creationId xmlns:a16="http://schemas.microsoft.com/office/drawing/2014/main" id="{3880B3EA-CAD7-46F9-AA95-B56D00F8218E}"/>
+              </a:ext>
+            </a:extLst>
+          </p:cNvPr>
+          <p:cNvSpPr txBox="1"/>
+          <p:nvPr/>
+        </p:nvSpPr>
+        <p:spPr>
+          <a:xfrm>
+            <a:off x="4081805" y="4176074"/>
+            <a:ext cx="4017165" cy="369332"/>
+          </a:xfrm>
+          <a:prstGeom prst="rect">
+            <a:avLst/>
+          </a:prstGeom>
+          <a:noFill/>
+        </p:spPr>
+        <p:txBody>
+          <a:bodyPr wrap="square" rtlCol="0">
+            <a:spAutoFit/>
+          </a:bodyPr>
+          <a:lstStyle/>
+          <a:p>
+            <a:r>
+              <a:rPr lang="en-US" dirty="0"/>
+              <a:t>Raspberry Pi, Arduino, node mcu32</a:t>
+            </a:r>
+          </a:p>
+        </p:txBody>
+      </p:sp>
+    </p:spTree>
+    <p:extLst>
+      <p:ext uri="{BB962C8B-B14F-4D97-AF65-F5344CB8AC3E}">
+        <p14:creationId xmlns:p14="http://schemas.microsoft.com/office/powerpoint/2010/main" val="1464393841"/>
+      </p:ext>
+    </p:extLst>
+  </p:cSld>
+  <p:clrMapOvr>
+    <a:masterClrMapping/>
+  </p:clrMapOvr>
+</p:sld>
+</file>
+
+<file path=ppt/slides/slide8.xml><?xml version="1.0" encoding="utf-8"?>
 <p:sld xmlns:a="http://schemas.openxmlformats.org/drawingml/2006/main" xmlns:r="http://schemas.openxmlformats.org/officeDocument/2006/relationships" xmlns:p="http://schemas.openxmlformats.org/presentationml/2006/main">
   <p:cSld>
     <p:spTree>
@@ -6791,7 +7237,7 @@
 </p:sld>
 </file>
 
-<file path=ppt/slides/slide6.xml><?xml version="1.0" encoding="utf-8"?>
+<file path=ppt/slides/slide9.xml><?xml version="1.0" encoding="utf-8"?>
 <p:sld xmlns:a="http://schemas.openxmlformats.org/drawingml/2006/main" xmlns:r="http://schemas.openxmlformats.org/officeDocument/2006/relationships" xmlns:p="http://schemas.openxmlformats.org/presentationml/2006/main">
   <p:cSld>
     <p:spTree>
@@ -6845,10 +7291,10 @@
       </p:sp>
       <p:pic>
         <p:nvPicPr>
-          <p:cNvPr id="8" name="Picture 7">
+          <p:cNvPr id="5" name="Picture 4">
             <a:extLst>
               <a:ext uri="{FF2B5EF4-FFF2-40B4-BE49-F238E27FC236}">
-                <a16:creationId xmlns:a16="http://schemas.microsoft.com/office/drawing/2014/main" id="{F8EB60BB-8AB1-4D18-BFC5-53BEE669F85D}"/>
+                <a16:creationId xmlns:a16="http://schemas.microsoft.com/office/drawing/2014/main" id="{5599C2D7-528E-4928-B4E6-A9DAE3080CB5}"/>
               </a:ext>
             </a:extLst>
           </p:cNvPr>
@@ -6871,8 +7317,8 @@
         </p:blipFill>
         <p:spPr>
           <a:xfrm>
-            <a:off x="0" y="773382"/>
-            <a:ext cx="12192000" cy="6226921"/>
+            <a:off x="81280" y="864822"/>
+            <a:ext cx="12110720" cy="5898002"/>
           </a:xfrm>
           <a:prstGeom prst="rect">
             <a:avLst/>

</xml_diff>